<commit_message>
writing the BAN logic
</commit_message>
<xml_diff>
--- a/绘图用ppt.pptx
+++ b/绘图用ppt.pptx
@@ -244,7 +244,7 @@
           <a:p>
             <a:fld id="{FB14A6DE-7ADC-4E2A-85DF-86B0BCFCD089}" type="datetimeFigureOut">
               <a:rPr lang="zh-CN" altLang="en-US" smtClean="0"/>
-              <a:t>2018/8/1</a:t>
+              <a:t>2018/8/7</a:t>
             </a:fld>
             <a:endParaRPr lang="zh-CN" altLang="en-US"/>
           </a:p>
@@ -414,7 +414,7 @@
           <a:p>
             <a:fld id="{FB14A6DE-7ADC-4E2A-85DF-86B0BCFCD089}" type="datetimeFigureOut">
               <a:rPr lang="zh-CN" altLang="en-US" smtClean="0"/>
-              <a:t>2018/8/1</a:t>
+              <a:t>2018/8/7</a:t>
             </a:fld>
             <a:endParaRPr lang="zh-CN" altLang="en-US"/>
           </a:p>
@@ -594,7 +594,7 @@
           <a:p>
             <a:fld id="{FB14A6DE-7ADC-4E2A-85DF-86B0BCFCD089}" type="datetimeFigureOut">
               <a:rPr lang="zh-CN" altLang="en-US" smtClean="0"/>
-              <a:t>2018/8/1</a:t>
+              <a:t>2018/8/7</a:t>
             </a:fld>
             <a:endParaRPr lang="zh-CN" altLang="en-US"/>
           </a:p>
@@ -764,7 +764,7 @@
           <a:p>
             <a:fld id="{FB14A6DE-7ADC-4E2A-85DF-86B0BCFCD089}" type="datetimeFigureOut">
               <a:rPr lang="zh-CN" altLang="en-US" smtClean="0"/>
-              <a:t>2018/8/1</a:t>
+              <a:t>2018/8/7</a:t>
             </a:fld>
             <a:endParaRPr lang="zh-CN" altLang="en-US"/>
           </a:p>
@@ -1010,7 +1010,7 @@
           <a:p>
             <a:fld id="{FB14A6DE-7ADC-4E2A-85DF-86B0BCFCD089}" type="datetimeFigureOut">
               <a:rPr lang="zh-CN" altLang="en-US" smtClean="0"/>
-              <a:t>2018/8/1</a:t>
+              <a:t>2018/8/7</a:t>
             </a:fld>
             <a:endParaRPr lang="zh-CN" altLang="en-US"/>
           </a:p>
@@ -1242,7 +1242,7 @@
           <a:p>
             <a:fld id="{FB14A6DE-7ADC-4E2A-85DF-86B0BCFCD089}" type="datetimeFigureOut">
               <a:rPr lang="zh-CN" altLang="en-US" smtClean="0"/>
-              <a:t>2018/8/1</a:t>
+              <a:t>2018/8/7</a:t>
             </a:fld>
             <a:endParaRPr lang="zh-CN" altLang="en-US"/>
           </a:p>
@@ -1609,7 +1609,7 @@
           <a:p>
             <a:fld id="{FB14A6DE-7ADC-4E2A-85DF-86B0BCFCD089}" type="datetimeFigureOut">
               <a:rPr lang="zh-CN" altLang="en-US" smtClean="0"/>
-              <a:t>2018/8/1</a:t>
+              <a:t>2018/8/7</a:t>
             </a:fld>
             <a:endParaRPr lang="zh-CN" altLang="en-US"/>
           </a:p>
@@ -1727,7 +1727,7 @@
           <a:p>
             <a:fld id="{FB14A6DE-7ADC-4E2A-85DF-86B0BCFCD089}" type="datetimeFigureOut">
               <a:rPr lang="zh-CN" altLang="en-US" smtClean="0"/>
-              <a:t>2018/8/1</a:t>
+              <a:t>2018/8/7</a:t>
             </a:fld>
             <a:endParaRPr lang="zh-CN" altLang="en-US"/>
           </a:p>
@@ -1822,7 +1822,7 @@
           <a:p>
             <a:fld id="{FB14A6DE-7ADC-4E2A-85DF-86B0BCFCD089}" type="datetimeFigureOut">
               <a:rPr lang="zh-CN" altLang="en-US" smtClean="0"/>
-              <a:t>2018/8/1</a:t>
+              <a:t>2018/8/7</a:t>
             </a:fld>
             <a:endParaRPr lang="zh-CN" altLang="en-US"/>
           </a:p>
@@ -2099,7 +2099,7 @@
           <a:p>
             <a:fld id="{FB14A6DE-7ADC-4E2A-85DF-86B0BCFCD089}" type="datetimeFigureOut">
               <a:rPr lang="zh-CN" altLang="en-US" smtClean="0"/>
-              <a:t>2018/8/1</a:t>
+              <a:t>2018/8/7</a:t>
             </a:fld>
             <a:endParaRPr lang="zh-CN" altLang="en-US"/>
           </a:p>
@@ -2352,7 +2352,7 @@
           <a:p>
             <a:fld id="{FB14A6DE-7ADC-4E2A-85DF-86B0BCFCD089}" type="datetimeFigureOut">
               <a:rPr lang="zh-CN" altLang="en-US" smtClean="0"/>
-              <a:t>2018/8/1</a:t>
+              <a:t>2018/8/7</a:t>
             </a:fld>
             <a:endParaRPr lang="zh-CN" altLang="en-US"/>
           </a:p>
@@ -2565,7 +2565,7 @@
           <a:p>
             <a:fld id="{FB14A6DE-7ADC-4E2A-85DF-86B0BCFCD089}" type="datetimeFigureOut">
               <a:rPr lang="zh-CN" altLang="en-US" smtClean="0"/>
-              <a:t>2018/8/1</a:t>
+              <a:t>2018/8/7</a:t>
             </a:fld>
             <a:endParaRPr lang="zh-CN" altLang="en-US"/>
           </a:p>
@@ -4087,14 +4087,14 @@
       </p:grpSpPr>
       <p:sp>
         <p:nvSpPr>
-          <p:cNvPr id="2" name="矩形 1"/>
+          <p:cNvPr id="4" name="矩形 3"/>
           <p:cNvSpPr/>
           <p:nvPr/>
         </p:nvSpPr>
         <p:spPr>
           <a:xfrm>
-            <a:off x="1154559" y="1929354"/>
-            <a:ext cx="2278314" cy="824732"/>
+            <a:off x="6032455" y="283811"/>
+            <a:ext cx="1351069" cy="407565"/>
           </a:xfrm>
           <a:prstGeom prst="rect">
             <a:avLst/>
@@ -4123,16 +4123,16 @@
           <a:p>
             <a:pPr algn="ctr"/>
             <a:r>
-              <a:rPr lang="zh-CN" altLang="en-US" sz="2000" b="1" dirty="0" smtClean="0">
+              <a:rPr lang="zh-CN" altLang="en-US" sz="1200" b="1" dirty="0" smtClean="0">
                 <a:solidFill>
                   <a:schemeClr val="tx1"/>
                 </a:solidFill>
                 <a:latin typeface="微软雅黑" panose="020B0503020204020204" pitchFamily="34" charset="-122"/>
                 <a:ea typeface="微软雅黑" panose="020B0503020204020204" pitchFamily="34" charset="-122"/>
               </a:rPr>
-              <a:t>理想化处理</a:t>
-            </a:r>
-            <a:endParaRPr lang="zh-CN" altLang="en-US" sz="2000" b="1" dirty="0">
+              <a:t>安全协议</a:t>
+            </a:r>
+            <a:endParaRPr lang="zh-CN" altLang="en-US" sz="1200" b="1" dirty="0">
               <a:solidFill>
                 <a:schemeClr val="tx1"/>
               </a:solidFill>
@@ -4144,14 +4144,93 @@
       </p:sp>
       <p:sp>
         <p:nvSpPr>
-          <p:cNvPr id="3" name="矩形 2"/>
+          <p:cNvPr id="14" name="右箭头 13"/>
           <p:cNvSpPr/>
           <p:nvPr/>
         </p:nvSpPr>
         <p:spPr>
-          <a:xfrm>
-            <a:off x="4180035" y="3858708"/>
-            <a:ext cx="2278314" cy="824732"/>
+          <a:xfrm rot="5400000">
+            <a:off x="6545568" y="691828"/>
+            <a:ext cx="325506" cy="375834"/>
+          </a:xfrm>
+          <a:prstGeom prst="rightArrow">
+            <a:avLst/>
+          </a:prstGeom>
+        </p:spPr>
+        <p:style>
+          <a:lnRef idx="2">
+            <a:schemeClr val="dk1">
+              <a:shade val="50000"/>
+            </a:schemeClr>
+          </a:lnRef>
+          <a:fillRef idx="1">
+            <a:schemeClr val="dk1"/>
+          </a:fillRef>
+          <a:effectRef idx="0">
+            <a:schemeClr val="dk1"/>
+          </a:effectRef>
+          <a:fontRef idx="minor">
+            <a:schemeClr val="lt1"/>
+          </a:fontRef>
+        </p:style>
+        <p:txBody>
+          <a:bodyPr rtlCol="0" anchor="ctr"/>
+          <a:lstStyle/>
+          <a:p>
+            <a:pPr algn="ctr"/>
+            <a:endParaRPr lang="zh-CN" altLang="en-US" sz="1200">
+              <a:latin typeface="微软雅黑" panose="020B0503020204020204" pitchFamily="34" charset="-122"/>
+              <a:ea typeface="微软雅黑" panose="020B0503020204020204" pitchFamily="34" charset="-122"/>
+            </a:endParaRPr>
+          </a:p>
+        </p:txBody>
+      </p:sp>
+      <p:cxnSp>
+        <p:nvCxnSpPr>
+          <p:cNvPr id="16" name="直接箭头连接符 15"/>
+          <p:cNvCxnSpPr>
+            <a:stCxn id="20" idx="2"/>
+            <a:endCxn id="21" idx="0"/>
+          </p:cNvCxnSpPr>
+          <p:nvPr/>
+        </p:nvCxnSpPr>
+        <p:spPr>
+          <a:xfrm>
+            <a:off x="4390924" y="1625901"/>
+            <a:ext cx="1122468" cy="447591"/>
+          </a:xfrm>
+          <a:prstGeom prst="straightConnector1">
+            <a:avLst/>
+          </a:prstGeom>
+          <a:ln w="22225">
+            <a:tailEnd type="triangle"/>
+          </a:ln>
+        </p:spPr>
+        <p:style>
+          <a:lnRef idx="2">
+            <a:schemeClr val="dk1"/>
+          </a:lnRef>
+          <a:fillRef idx="0">
+            <a:schemeClr val="dk1"/>
+          </a:fillRef>
+          <a:effectRef idx="1">
+            <a:schemeClr val="dk1"/>
+          </a:effectRef>
+          <a:fontRef idx="minor">
+            <a:schemeClr val="tx1"/>
+          </a:fontRef>
+        </p:style>
+      </p:cxnSp>
+      <p:sp>
+        <p:nvSpPr>
+          <p:cNvPr id="20" name="矩形 19"/>
+          <p:cNvSpPr/>
+          <p:nvPr/>
+        </p:nvSpPr>
+        <p:spPr>
+          <a:xfrm>
+            <a:off x="3715389" y="1218336"/>
+            <a:ext cx="1351069" cy="407565"/>
           </a:xfrm>
           <a:prstGeom prst="rect">
             <a:avLst/>
@@ -4180,16 +4259,16 @@
           <a:p>
             <a:pPr algn="ctr"/>
             <a:r>
-              <a:rPr lang="zh-CN" altLang="en-US" sz="2000" b="1" dirty="0" smtClean="0">
+              <a:rPr lang="zh-CN" altLang="en-US" sz="1200" b="1" dirty="0" smtClean="0">
                 <a:solidFill>
                   <a:schemeClr val="tx1"/>
                 </a:solidFill>
                 <a:latin typeface="微软雅黑" panose="020B0503020204020204" pitchFamily="34" charset="-122"/>
                 <a:ea typeface="微软雅黑" panose="020B0503020204020204" pitchFamily="34" charset="-122"/>
               </a:rPr>
-              <a:t>初始假设</a:t>
-            </a:r>
-            <a:endParaRPr lang="zh-CN" altLang="en-US" sz="2000" b="1" dirty="0">
+              <a:t>协议消息</a:t>
+            </a:r>
+            <a:endParaRPr lang="zh-CN" altLang="en-US" sz="1200" b="1" dirty="0">
               <a:solidFill>
                 <a:schemeClr val="tx1"/>
               </a:solidFill>
@@ -4201,14 +4280,104 @@
       </p:sp>
       <p:sp>
         <p:nvSpPr>
-          <p:cNvPr id="4" name="矩形 3"/>
+          <p:cNvPr id="21" name="矩形 20"/>
           <p:cNvSpPr/>
           <p:nvPr/>
         </p:nvSpPr>
         <p:spPr>
           <a:xfrm>
-            <a:off x="4180035" y="1929354"/>
-            <a:ext cx="2278314" cy="824732"/>
+            <a:off x="4837857" y="2073492"/>
+            <a:ext cx="1351069" cy="622588"/>
+          </a:xfrm>
+          <a:prstGeom prst="rect">
+            <a:avLst/>
+          </a:prstGeom>
+          <a:solidFill>
+            <a:schemeClr val="tx2">
+              <a:lumMod val="20000"/>
+              <a:lumOff val="80000"/>
+            </a:schemeClr>
+          </a:solidFill>
+        </p:spPr>
+        <p:style>
+          <a:lnRef idx="2">
+            <a:schemeClr val="dk1"/>
+          </a:lnRef>
+          <a:fillRef idx="1">
+            <a:schemeClr val="lt1"/>
+          </a:fillRef>
+          <a:effectRef idx="0">
+            <a:schemeClr val="dk1"/>
+          </a:effectRef>
+          <a:fontRef idx="minor">
+            <a:schemeClr val="dk1"/>
+          </a:fontRef>
+        </p:style>
+        <p:txBody>
+          <a:bodyPr rtlCol="0" anchor="ctr"/>
+          <a:lstStyle/>
+          <a:p>
+            <a:pPr algn="ctr"/>
+            <a:r>
+              <a:rPr lang="en-US" altLang="zh-CN" sz="1200" b="1" dirty="0" smtClean="0">
+                <a:solidFill>
+                  <a:schemeClr val="tx1"/>
+                </a:solidFill>
+                <a:latin typeface="微软雅黑" panose="020B0503020204020204" pitchFamily="34" charset="-122"/>
+                <a:ea typeface="微软雅黑" panose="020B0503020204020204" pitchFamily="34" charset="-122"/>
+              </a:rPr>
+              <a:t>BAN</a:t>
+            </a:r>
+            <a:r>
+              <a:rPr lang="zh-CN" altLang="en-US" sz="1200" b="1" dirty="0" smtClean="0">
+                <a:solidFill>
+                  <a:schemeClr val="tx1"/>
+                </a:solidFill>
+                <a:latin typeface="微软雅黑" panose="020B0503020204020204" pitchFamily="34" charset="-122"/>
+                <a:ea typeface="微软雅黑" panose="020B0503020204020204" pitchFamily="34" charset="-122"/>
+              </a:rPr>
+              <a:t>逻辑</a:t>
+            </a:r>
+            <a:endParaRPr lang="en-US" altLang="zh-CN" sz="1200" b="1" dirty="0" smtClean="0">
+              <a:solidFill>
+                <a:schemeClr val="tx1"/>
+              </a:solidFill>
+              <a:latin typeface="微软雅黑" panose="020B0503020204020204" pitchFamily="34" charset="-122"/>
+              <a:ea typeface="微软雅黑" panose="020B0503020204020204" pitchFamily="34" charset="-122"/>
+            </a:endParaRPr>
+          </a:p>
+          <a:p>
+            <a:pPr algn="ctr"/>
+            <a:r>
+              <a:rPr lang="zh-CN" altLang="en-US" sz="1200" b="1" dirty="0" smtClean="0">
+                <a:solidFill>
+                  <a:schemeClr val="tx1"/>
+                </a:solidFill>
+                <a:latin typeface="微软雅黑" panose="020B0503020204020204" pitchFamily="34" charset="-122"/>
+                <a:ea typeface="微软雅黑" panose="020B0503020204020204" pitchFamily="34" charset="-122"/>
+              </a:rPr>
+              <a:t>协议分析器</a:t>
+            </a:r>
+            <a:endParaRPr lang="zh-CN" altLang="en-US" sz="1200" b="1" dirty="0">
+              <a:solidFill>
+                <a:schemeClr val="tx1"/>
+              </a:solidFill>
+              <a:latin typeface="微软雅黑" panose="020B0503020204020204" pitchFamily="34" charset="-122"/>
+              <a:ea typeface="微软雅黑" panose="020B0503020204020204" pitchFamily="34" charset="-122"/>
+            </a:endParaRPr>
+          </a:p>
+        </p:txBody>
+      </p:sp>
+      <p:sp>
+        <p:nvSpPr>
+          <p:cNvPr id="22" name="矩形 21"/>
+          <p:cNvSpPr/>
+          <p:nvPr/>
+        </p:nvSpPr>
+        <p:spPr>
+          <a:xfrm>
+            <a:off x="6032454" y="1195268"/>
+            <a:ext cx="1351069" cy="407565"/>
           </a:xfrm>
           <a:prstGeom prst="rect">
             <a:avLst/>
@@ -4237,16 +4406,16 @@
           <a:p>
             <a:pPr algn="ctr"/>
             <a:r>
-              <a:rPr lang="zh-CN" altLang="en-US" sz="2000" b="1" dirty="0" smtClean="0">
+              <a:rPr lang="zh-CN" altLang="en-US" sz="1200" b="1" dirty="0" smtClean="0">
                 <a:solidFill>
                   <a:schemeClr val="tx1"/>
                 </a:solidFill>
                 <a:latin typeface="微软雅黑" panose="020B0503020204020204" pitchFamily="34" charset="-122"/>
                 <a:ea typeface="微软雅黑" panose="020B0503020204020204" pitchFamily="34" charset="-122"/>
               </a:rPr>
-              <a:t>符号</a:t>
-            </a:r>
-            <a:endParaRPr lang="zh-CN" altLang="en-US" sz="2000" b="1" dirty="0">
+              <a:t>初始化假设</a:t>
+            </a:r>
+            <a:endParaRPr lang="zh-CN" altLang="en-US" sz="1200" b="1" dirty="0">
               <a:solidFill>
                 <a:schemeClr val="tx1"/>
               </a:solidFill>
@@ -4258,14 +4427,14 @@
       </p:sp>
       <p:sp>
         <p:nvSpPr>
-          <p:cNvPr id="5" name="矩形 4"/>
+          <p:cNvPr id="23" name="矩形 22"/>
           <p:cNvSpPr/>
           <p:nvPr/>
         </p:nvSpPr>
         <p:spPr>
           <a:xfrm>
-            <a:off x="1154559" y="4369046"/>
-            <a:ext cx="2278314" cy="824732"/>
+            <a:off x="2083506" y="4922225"/>
+            <a:ext cx="1351069" cy="407565"/>
           </a:xfrm>
           <a:prstGeom prst="rect">
             <a:avLst/>
@@ -4294,16 +4463,16 @@
           <a:p>
             <a:pPr algn="ctr"/>
             <a:r>
-              <a:rPr lang="zh-CN" altLang="en-US" sz="2000" b="1" dirty="0" smtClean="0">
+              <a:rPr lang="zh-CN" altLang="en-US" sz="1200" b="1" dirty="0" smtClean="0">
                 <a:solidFill>
                   <a:schemeClr val="tx1"/>
                 </a:solidFill>
                 <a:latin typeface="微软雅黑" panose="020B0503020204020204" pitchFamily="34" charset="-122"/>
                 <a:ea typeface="微软雅黑" panose="020B0503020204020204" pitchFamily="34" charset="-122"/>
               </a:rPr>
-              <a:t>协议消息</a:t>
-            </a:r>
-            <a:endParaRPr lang="zh-CN" altLang="en-US" sz="2000" b="1" dirty="0">
+              <a:t>协议不安全</a:t>
+            </a:r>
+            <a:endParaRPr lang="zh-CN" altLang="en-US" sz="1200" b="1" dirty="0">
               <a:solidFill>
                 <a:schemeClr val="tx1"/>
               </a:solidFill>
@@ -4315,14 +4484,14 @@
       </p:sp>
       <p:sp>
         <p:nvSpPr>
-          <p:cNvPr id="6" name="矩形 5"/>
+          <p:cNvPr id="25" name="矩形 24"/>
           <p:cNvSpPr/>
           <p:nvPr/>
         </p:nvSpPr>
         <p:spPr>
           <a:xfrm>
-            <a:off x="7707085" y="1766069"/>
-            <a:ext cx="867124" cy="3015343"/>
+            <a:off x="4837857" y="6010556"/>
+            <a:ext cx="1351069" cy="407565"/>
           </a:xfrm>
           <a:prstGeom prst="rect">
             <a:avLst/>
@@ -4351,16 +4520,16 @@
           <a:p>
             <a:pPr algn="ctr"/>
             <a:r>
-              <a:rPr lang="zh-CN" altLang="en-US" sz="2000" b="1" dirty="0" smtClean="0">
+              <a:rPr lang="zh-CN" altLang="en-US" sz="1200" b="1" dirty="0" smtClean="0">
                 <a:solidFill>
                   <a:schemeClr val="tx1"/>
                 </a:solidFill>
                 <a:latin typeface="微软雅黑" panose="020B0503020204020204" pitchFamily="34" charset="-122"/>
                 <a:ea typeface="微软雅黑" panose="020B0503020204020204" pitchFamily="34" charset="-122"/>
               </a:rPr>
-              <a:t>推理</a:t>
-            </a:r>
-            <a:endParaRPr lang="en-US" altLang="zh-CN" sz="2000" b="1" dirty="0" smtClean="0">
+              <a:t>协议安全</a:t>
+            </a:r>
+            <a:endParaRPr lang="zh-CN" altLang="en-US" sz="1200" b="1" dirty="0">
               <a:solidFill>
                 <a:schemeClr val="tx1"/>
               </a:solidFill>
@@ -4368,48 +4537,18 @@
               <a:ea typeface="微软雅黑" panose="020B0503020204020204" pitchFamily="34" charset="-122"/>
             </a:endParaRPr>
           </a:p>
-          <a:p>
-            <a:pPr algn="ctr"/>
-            <a:endParaRPr lang="en-US" altLang="zh-CN" sz="2000" b="1" dirty="0">
-              <a:solidFill>
-                <a:schemeClr val="tx1"/>
-              </a:solidFill>
-              <a:latin typeface="微软雅黑" panose="020B0503020204020204" pitchFamily="34" charset="-122"/>
-              <a:ea typeface="微软雅黑" panose="020B0503020204020204" pitchFamily="34" charset="-122"/>
-            </a:endParaRPr>
-          </a:p>
-          <a:p>
-            <a:pPr algn="ctr"/>
-            <a:r>
-              <a:rPr lang="zh-CN" altLang="en-US" sz="2000" b="1" dirty="0" smtClean="0">
-                <a:solidFill>
-                  <a:schemeClr val="tx1"/>
-                </a:solidFill>
-                <a:latin typeface="微软雅黑" panose="020B0503020204020204" pitchFamily="34" charset="-122"/>
-                <a:ea typeface="微软雅黑" panose="020B0503020204020204" pitchFamily="34" charset="-122"/>
-              </a:rPr>
-              <a:t>法则</a:t>
-            </a:r>
-            <a:endParaRPr lang="zh-CN" altLang="en-US" sz="2000" b="1" dirty="0">
-              <a:solidFill>
-                <a:schemeClr val="tx1"/>
-              </a:solidFill>
-              <a:latin typeface="微软雅黑" panose="020B0503020204020204" pitchFamily="34" charset="-122"/>
-              <a:ea typeface="微软雅黑" panose="020B0503020204020204" pitchFamily="34" charset="-122"/>
-            </a:endParaRPr>
-          </a:p>
-        </p:txBody>
-      </p:sp>
-      <p:sp>
-        <p:nvSpPr>
-          <p:cNvPr id="7" name="矩形 6"/>
+        </p:txBody>
+      </p:sp>
+      <p:sp>
+        <p:nvSpPr>
+          <p:cNvPr id="26" name="矩形 25"/>
           <p:cNvSpPr/>
           <p:nvPr/>
         </p:nvSpPr>
         <p:spPr>
           <a:xfrm>
-            <a:off x="9471124" y="2572626"/>
-            <a:ext cx="1828800" cy="1676400"/>
+            <a:off x="8549348" y="1218335"/>
+            <a:ext cx="1351069" cy="407565"/>
           </a:xfrm>
           <a:prstGeom prst="rect">
             <a:avLst/>
@@ -4438,16 +4577,16 @@
           <a:p>
             <a:pPr algn="ctr"/>
             <a:r>
-              <a:rPr lang="zh-CN" altLang="en-US" sz="2000" b="1" dirty="0" smtClean="0">
+              <a:rPr lang="zh-CN" altLang="en-US" sz="1200" b="1" dirty="0" smtClean="0">
                 <a:solidFill>
                   <a:schemeClr val="tx1"/>
                 </a:solidFill>
                 <a:latin typeface="微软雅黑" panose="020B0503020204020204" pitchFamily="34" charset="-122"/>
                 <a:ea typeface="微软雅黑" panose="020B0503020204020204" pitchFamily="34" charset="-122"/>
               </a:rPr>
-              <a:t>断言</a:t>
-            </a:r>
-            <a:endParaRPr lang="zh-CN" altLang="en-US" sz="2000" b="1" dirty="0">
+              <a:t>协议目标</a:t>
+            </a:r>
+            <a:endParaRPr lang="zh-CN" altLang="en-US" sz="1200" b="1" dirty="0">
               <a:solidFill>
                 <a:schemeClr val="tx1"/>
               </a:solidFill>
@@ -4457,26 +4596,65 @@
           </a:p>
         </p:txBody>
       </p:sp>
+      <p:sp>
+        <p:nvSpPr>
+          <p:cNvPr id="27" name="左大括号 26"/>
+          <p:cNvSpPr/>
+          <p:nvPr/>
+        </p:nvSpPr>
+        <p:spPr>
+          <a:xfrm rot="5400000">
+            <a:off x="6596426" y="-1341473"/>
+            <a:ext cx="356940" cy="4767943"/>
+          </a:xfrm>
+          <a:prstGeom prst="leftBrace">
+            <a:avLst>
+              <a:gd name="adj1" fmla="val 8333"/>
+              <a:gd name="adj2" fmla="val 51323"/>
+            </a:avLst>
+          </a:prstGeom>
+        </p:spPr>
+        <p:style>
+          <a:lnRef idx="3">
+            <a:schemeClr val="dk1"/>
+          </a:lnRef>
+          <a:fillRef idx="0">
+            <a:schemeClr val="dk1"/>
+          </a:fillRef>
+          <a:effectRef idx="2">
+            <a:schemeClr val="dk1"/>
+          </a:effectRef>
+          <a:fontRef idx="minor">
+            <a:schemeClr val="tx1"/>
+          </a:fontRef>
+        </p:style>
+        <p:txBody>
+          <a:bodyPr rtlCol="0" anchor="ctr"/>
+          <a:lstStyle/>
+          <a:p>
+            <a:pPr algn="ctr"/>
+            <a:endParaRPr lang="zh-CN" altLang="en-US" sz="1200"/>
+          </a:p>
+        </p:txBody>
+      </p:sp>
       <p:cxnSp>
         <p:nvCxnSpPr>
-          <p:cNvPr id="9" name="肘形连接符 8"/>
+          <p:cNvPr id="29" name="直接箭头连接符 28"/>
           <p:cNvCxnSpPr>
-            <a:stCxn id="5" idx="1"/>
-            <a:endCxn id="2" idx="1"/>
+            <a:stCxn id="22" idx="2"/>
+            <a:endCxn id="21" idx="0"/>
           </p:cNvCxnSpPr>
           <p:nvPr/>
         </p:nvCxnSpPr>
         <p:spPr>
-          <a:xfrm rot="10800000">
-            <a:off x="1154559" y="2341720"/>
-            <a:ext cx="12700" cy="2439692"/>
-          </a:xfrm>
-          <a:prstGeom prst="bentConnector3">
-            <a:avLst>
-              <a:gd name="adj1" fmla="val 5400000"/>
-            </a:avLst>
+          <a:xfrm flipH="1">
+            <a:off x="5513392" y="1602833"/>
+            <a:ext cx="1194597" cy="470659"/>
+          </a:xfrm>
+          <a:prstGeom prst="straightConnector1">
+            <a:avLst/>
           </a:prstGeom>
-          <a:ln>
+          <a:ln w="22225">
             <a:tailEnd type="triangle"/>
           </a:ln>
         </p:spPr>
@@ -4497,33 +4675,31 @@
       </p:cxnSp>
       <p:sp>
         <p:nvSpPr>
-          <p:cNvPr id="11" name="右箭头 10"/>
+          <p:cNvPr id="32" name="流程图: 数据 31"/>
           <p:cNvSpPr/>
           <p:nvPr/>
         </p:nvSpPr>
         <p:spPr>
           <a:xfrm>
-            <a:off x="3432873" y="2127880"/>
-            <a:ext cx="747162" cy="375834"/>
-          </a:xfrm>
-          <a:prstGeom prst="rightArrow">
+            <a:off x="4692625" y="3024496"/>
+            <a:ext cx="1641531" cy="524107"/>
+          </a:xfrm>
+          <a:prstGeom prst="flowChartInputOutput">
             <a:avLst/>
           </a:prstGeom>
         </p:spPr>
         <p:style>
           <a:lnRef idx="2">
-            <a:schemeClr val="dk1">
-              <a:shade val="50000"/>
-            </a:schemeClr>
+            <a:schemeClr val="dk1"/>
           </a:lnRef>
           <a:fillRef idx="1">
-            <a:schemeClr val="dk1"/>
+            <a:schemeClr val="lt1"/>
           </a:fillRef>
           <a:effectRef idx="0">
             <a:schemeClr val="dk1"/>
           </a:effectRef>
           <a:fontRef idx="minor">
-            <a:schemeClr val="lt1"/>
+            <a:schemeClr val="dk1"/>
           </a:fontRef>
         </p:style>
         <p:txBody>
@@ -4531,39 +4707,47 @@
           <a:lstStyle/>
           <a:p>
             <a:pPr algn="ctr"/>
-            <a:endParaRPr lang="zh-CN" altLang="en-US"/>
-          </a:p>
-        </p:txBody>
-      </p:sp>
-      <p:sp>
-        <p:nvSpPr>
-          <p:cNvPr id="12" name="右箭头 11"/>
+            <a:r>
+              <a:rPr lang="zh-CN" altLang="en-US" sz="1200" b="1" dirty="0" smtClean="0">
+                <a:latin typeface="微软雅黑" panose="020B0503020204020204" pitchFamily="34" charset="-122"/>
+                <a:ea typeface="微软雅黑" panose="020B0503020204020204" pitchFamily="34" charset="-122"/>
+              </a:rPr>
+              <a:t>中间推导结论</a:t>
+            </a:r>
+            <a:endParaRPr lang="zh-CN" altLang="en-US" sz="1200" b="1" dirty="0">
+              <a:latin typeface="微软雅黑" panose="020B0503020204020204" pitchFamily="34" charset="-122"/>
+              <a:ea typeface="微软雅黑" panose="020B0503020204020204" pitchFamily="34" charset="-122"/>
+            </a:endParaRPr>
+          </a:p>
+        </p:txBody>
+      </p:sp>
+      <p:sp>
+        <p:nvSpPr>
+          <p:cNvPr id="33" name="流程图: 决策 32"/>
           <p:cNvSpPr/>
           <p:nvPr/>
         </p:nvSpPr>
         <p:spPr>
           <a:xfrm>
-            <a:off x="6709136" y="2153803"/>
-            <a:ext cx="747162" cy="375834"/>
-          </a:xfrm>
-          <a:prstGeom prst="rightArrow">
+            <a:off x="4672116" y="3816192"/>
+            <a:ext cx="1682548" cy="711383"/>
+          </a:xfrm>
+          <a:prstGeom prst="flowChartDecision">
             <a:avLst/>
           </a:prstGeom>
         </p:spPr>
         <p:style>
           <a:lnRef idx="2">
-            <a:schemeClr val="dk1">
-              <a:shade val="50000"/>
-            </a:schemeClr>
+            <a:schemeClr val="dk1"/>
           </a:lnRef>
           <a:fillRef idx="1">
-            <a:schemeClr val="dk1"/>
+            <a:schemeClr val="lt1"/>
           </a:fillRef>
           <a:effectRef idx="0">
             <a:schemeClr val="dk1"/>
           </a:effectRef>
           <a:fontRef idx="minor">
-            <a:schemeClr val="lt1"/>
+            <a:schemeClr val="dk1"/>
           </a:fontRef>
         </p:style>
         <p:txBody>
@@ -4571,39 +4755,47 @@
           <a:lstStyle/>
           <a:p>
             <a:pPr algn="ctr"/>
-            <a:endParaRPr lang="zh-CN" altLang="en-US"/>
-          </a:p>
-        </p:txBody>
-      </p:sp>
-      <p:sp>
-        <p:nvSpPr>
-          <p:cNvPr id="13" name="右箭头 12"/>
+            <a:r>
+              <a:rPr lang="zh-CN" altLang="en-US" sz="1200" b="1" dirty="0" smtClean="0">
+                <a:latin typeface="微软雅黑" panose="020B0503020204020204" pitchFamily="34" charset="-122"/>
+                <a:ea typeface="微软雅黑" panose="020B0503020204020204" pitchFamily="34" charset="-122"/>
+              </a:rPr>
+              <a:t>分析完毕</a:t>
+            </a:r>
+            <a:endParaRPr lang="zh-CN" altLang="en-US" sz="1200" b="1" dirty="0">
+              <a:latin typeface="微软雅黑" panose="020B0503020204020204" pitchFamily="34" charset="-122"/>
+              <a:ea typeface="微软雅黑" panose="020B0503020204020204" pitchFamily="34" charset="-122"/>
+            </a:endParaRPr>
+          </a:p>
+        </p:txBody>
+      </p:sp>
+      <p:sp>
+        <p:nvSpPr>
+          <p:cNvPr id="34" name="流程图: 决策 33"/>
           <p:cNvSpPr/>
           <p:nvPr/>
         </p:nvSpPr>
         <p:spPr>
           <a:xfrm>
-            <a:off x="6745181" y="4061109"/>
-            <a:ext cx="747162" cy="375834"/>
-          </a:xfrm>
-          <a:prstGeom prst="rightArrow">
+            <a:off x="4746478" y="4770315"/>
+            <a:ext cx="1533823" cy="711383"/>
+          </a:xfrm>
+          <a:prstGeom prst="flowChartDecision">
             <a:avLst/>
           </a:prstGeom>
         </p:spPr>
         <p:style>
           <a:lnRef idx="2">
-            <a:schemeClr val="dk1">
-              <a:shade val="50000"/>
-            </a:schemeClr>
+            <a:schemeClr val="dk1"/>
           </a:lnRef>
           <a:fillRef idx="1">
-            <a:schemeClr val="dk1"/>
+            <a:schemeClr val="lt1"/>
           </a:fillRef>
           <a:effectRef idx="0">
             <a:schemeClr val="dk1"/>
           </a:effectRef>
           <a:fontRef idx="minor">
-            <a:schemeClr val="lt1"/>
+            <a:schemeClr val="dk1"/>
           </a:fontRef>
         </p:style>
         <p:txBody>
@@ -4611,47 +4803,485 @@
           <a:lstStyle/>
           <a:p>
             <a:pPr algn="ctr"/>
-            <a:endParaRPr lang="zh-CN" altLang="en-US"/>
-          </a:p>
-        </p:txBody>
-      </p:sp>
-      <p:sp>
-        <p:nvSpPr>
-          <p:cNvPr id="14" name="右箭头 13"/>
+            <a:r>
+              <a:rPr lang="zh-CN" altLang="en-US" sz="1200" b="1" dirty="0" smtClean="0">
+                <a:latin typeface="微软雅黑" panose="020B0503020204020204" pitchFamily="34" charset="-122"/>
+                <a:ea typeface="微软雅黑" panose="020B0503020204020204" pitchFamily="34" charset="-122"/>
+              </a:rPr>
+              <a:t>安全性验证</a:t>
+            </a:r>
+            <a:endParaRPr lang="zh-CN" altLang="en-US" sz="1200" b="1" dirty="0">
+              <a:latin typeface="微软雅黑" panose="020B0503020204020204" pitchFamily="34" charset="-122"/>
+              <a:ea typeface="微软雅黑" panose="020B0503020204020204" pitchFamily="34" charset="-122"/>
+            </a:endParaRPr>
+          </a:p>
+        </p:txBody>
+      </p:sp>
+      <p:cxnSp>
+        <p:nvCxnSpPr>
+          <p:cNvPr id="35" name="直接箭头连接符 34"/>
+          <p:cNvCxnSpPr>
+            <a:stCxn id="21" idx="2"/>
+            <a:endCxn id="32" idx="1"/>
+          </p:cNvCxnSpPr>
+          <p:nvPr/>
+        </p:nvCxnSpPr>
+        <p:spPr>
+          <a:xfrm flipH="1">
+            <a:off x="5513391" y="2696080"/>
+            <a:ext cx="1" cy="328416"/>
+          </a:xfrm>
+          <a:prstGeom prst="straightConnector1">
+            <a:avLst/>
+          </a:prstGeom>
+          <a:ln w="22225">
+            <a:tailEnd type="triangle"/>
+          </a:ln>
+        </p:spPr>
+        <p:style>
+          <a:lnRef idx="2">
+            <a:schemeClr val="dk1"/>
+          </a:lnRef>
+          <a:fillRef idx="0">
+            <a:schemeClr val="dk1"/>
+          </a:fillRef>
+          <a:effectRef idx="1">
+            <a:schemeClr val="dk1"/>
+          </a:effectRef>
+          <a:fontRef idx="minor">
+            <a:schemeClr val="tx1"/>
+          </a:fontRef>
+        </p:style>
+      </p:cxnSp>
+      <p:cxnSp>
+        <p:nvCxnSpPr>
+          <p:cNvPr id="38" name="直接箭头连接符 37"/>
+          <p:cNvCxnSpPr>
+            <a:stCxn id="32" idx="4"/>
+            <a:endCxn id="33" idx="0"/>
+          </p:cNvCxnSpPr>
+          <p:nvPr/>
+        </p:nvCxnSpPr>
+        <p:spPr>
+          <a:xfrm flipH="1">
+            <a:off x="5513390" y="3548603"/>
+            <a:ext cx="1" cy="267589"/>
+          </a:xfrm>
+          <a:prstGeom prst="straightConnector1">
+            <a:avLst/>
+          </a:prstGeom>
+          <a:ln w="22225">
+            <a:tailEnd type="triangle"/>
+          </a:ln>
+        </p:spPr>
+        <p:style>
+          <a:lnRef idx="2">
+            <a:schemeClr val="dk1"/>
+          </a:lnRef>
+          <a:fillRef idx="0">
+            <a:schemeClr val="dk1"/>
+          </a:fillRef>
+          <a:effectRef idx="1">
+            <a:schemeClr val="dk1"/>
+          </a:effectRef>
+          <a:fontRef idx="minor">
+            <a:schemeClr val="tx1"/>
+          </a:fontRef>
+        </p:style>
+      </p:cxnSp>
+      <p:cxnSp>
+        <p:nvCxnSpPr>
+          <p:cNvPr id="42" name="直接箭头连接符 41"/>
+          <p:cNvCxnSpPr>
+            <a:stCxn id="33" idx="2"/>
+            <a:endCxn id="34" idx="0"/>
+          </p:cNvCxnSpPr>
+          <p:nvPr/>
+        </p:nvCxnSpPr>
+        <p:spPr>
+          <a:xfrm>
+            <a:off x="5513390" y="4527575"/>
+            <a:ext cx="0" cy="242740"/>
+          </a:xfrm>
+          <a:prstGeom prst="straightConnector1">
+            <a:avLst/>
+          </a:prstGeom>
+          <a:ln w="22225">
+            <a:tailEnd type="triangle"/>
+          </a:ln>
+        </p:spPr>
+        <p:style>
+          <a:lnRef idx="2">
+            <a:schemeClr val="dk1"/>
+          </a:lnRef>
+          <a:fillRef idx="0">
+            <a:schemeClr val="dk1"/>
+          </a:fillRef>
+          <a:effectRef idx="1">
+            <a:schemeClr val="dk1"/>
+          </a:effectRef>
+          <a:fontRef idx="minor">
+            <a:schemeClr val="tx1"/>
+          </a:fontRef>
+        </p:style>
+      </p:cxnSp>
+      <p:cxnSp>
+        <p:nvCxnSpPr>
+          <p:cNvPr id="46" name="直接箭头连接符 45"/>
+          <p:cNvCxnSpPr>
+            <a:stCxn id="34" idx="2"/>
+            <a:endCxn id="25" idx="0"/>
+          </p:cNvCxnSpPr>
+          <p:nvPr/>
+        </p:nvCxnSpPr>
+        <p:spPr>
+          <a:xfrm>
+            <a:off x="5513390" y="5481698"/>
+            <a:ext cx="2" cy="528858"/>
+          </a:xfrm>
+          <a:prstGeom prst="straightConnector1">
+            <a:avLst/>
+          </a:prstGeom>
+          <a:ln w="22225">
+            <a:tailEnd type="triangle"/>
+          </a:ln>
+        </p:spPr>
+        <p:style>
+          <a:lnRef idx="2">
+            <a:schemeClr val="dk1"/>
+          </a:lnRef>
+          <a:fillRef idx="0">
+            <a:schemeClr val="dk1"/>
+          </a:fillRef>
+          <a:effectRef idx="1">
+            <a:schemeClr val="dk1"/>
+          </a:effectRef>
+          <a:fontRef idx="minor">
+            <a:schemeClr val="tx1"/>
+          </a:fontRef>
+        </p:style>
+      </p:cxnSp>
+      <p:cxnSp>
+        <p:nvCxnSpPr>
+          <p:cNvPr id="50" name="直接箭头连接符 49"/>
+          <p:cNvCxnSpPr>
+            <a:stCxn id="34" idx="1"/>
+            <a:endCxn id="23" idx="3"/>
+          </p:cNvCxnSpPr>
+          <p:nvPr/>
+        </p:nvCxnSpPr>
+        <p:spPr>
+          <a:xfrm flipH="1">
+            <a:off x="3434575" y="5126007"/>
+            <a:ext cx="1311903" cy="1"/>
+          </a:xfrm>
+          <a:prstGeom prst="straightConnector1">
+            <a:avLst/>
+          </a:prstGeom>
+          <a:ln w="22225">
+            <a:tailEnd type="triangle"/>
+          </a:ln>
+        </p:spPr>
+        <p:style>
+          <a:lnRef idx="2">
+            <a:schemeClr val="dk1"/>
+          </a:lnRef>
+          <a:fillRef idx="0">
+            <a:schemeClr val="dk1"/>
+          </a:fillRef>
+          <a:effectRef idx="1">
+            <a:schemeClr val="dk1"/>
+          </a:effectRef>
+          <a:fontRef idx="minor">
+            <a:schemeClr val="tx1"/>
+          </a:fontRef>
+        </p:style>
+      </p:cxnSp>
+      <p:cxnSp>
+        <p:nvCxnSpPr>
+          <p:cNvPr id="54" name="肘形连接符 53"/>
+          <p:cNvCxnSpPr>
+            <a:stCxn id="26" idx="2"/>
+            <a:endCxn id="34" idx="3"/>
+          </p:cNvCxnSpPr>
+          <p:nvPr/>
+        </p:nvCxnSpPr>
+        <p:spPr>
+          <a:xfrm rot="5400000">
+            <a:off x="6002539" y="1903662"/>
+            <a:ext cx="3500107" cy="2944582"/>
+          </a:xfrm>
+          <a:prstGeom prst="bentConnector2">
+            <a:avLst/>
+          </a:prstGeom>
+          <a:ln w="22225">
+            <a:tailEnd type="triangle"/>
+          </a:ln>
+        </p:spPr>
+        <p:style>
+          <a:lnRef idx="1">
+            <a:schemeClr val="dk1"/>
+          </a:lnRef>
+          <a:fillRef idx="0">
+            <a:schemeClr val="dk1"/>
+          </a:fillRef>
+          <a:effectRef idx="0">
+            <a:schemeClr val="dk1"/>
+          </a:effectRef>
+          <a:fontRef idx="minor">
+            <a:schemeClr val="tx1"/>
+          </a:fontRef>
+        </p:style>
+      </p:cxnSp>
+      <p:cxnSp>
+        <p:nvCxnSpPr>
+          <p:cNvPr id="55" name="肘形连接符 54"/>
+          <p:cNvCxnSpPr>
+            <a:stCxn id="32" idx="5"/>
+            <a:endCxn id="21" idx="3"/>
+          </p:cNvCxnSpPr>
+          <p:nvPr/>
+        </p:nvCxnSpPr>
+        <p:spPr>
+          <a:xfrm flipV="1">
+            <a:off x="6170003" y="2384786"/>
+            <a:ext cx="18923" cy="901764"/>
+          </a:xfrm>
+          <a:prstGeom prst="bentConnector3">
+            <a:avLst>
+              <a:gd name="adj1" fmla="val 4904143"/>
+            </a:avLst>
+          </a:prstGeom>
+          <a:ln w="22225">
+            <a:tailEnd type="triangle"/>
+          </a:ln>
+        </p:spPr>
+        <p:style>
+          <a:lnRef idx="1">
+            <a:schemeClr val="dk1"/>
+          </a:lnRef>
+          <a:fillRef idx="0">
+            <a:schemeClr val="dk1"/>
+          </a:fillRef>
+          <a:effectRef idx="0">
+            <a:schemeClr val="dk1"/>
+          </a:effectRef>
+          <a:fontRef idx="minor">
+            <a:schemeClr val="tx1"/>
+          </a:fontRef>
+        </p:style>
+      </p:cxnSp>
+      <p:cxnSp>
+        <p:nvCxnSpPr>
+          <p:cNvPr id="59" name="肘形连接符 58"/>
+          <p:cNvCxnSpPr>
+            <a:stCxn id="33" idx="1"/>
+            <a:endCxn id="21" idx="1"/>
+          </p:cNvCxnSpPr>
+          <p:nvPr/>
+        </p:nvCxnSpPr>
+        <p:spPr>
+          <a:xfrm rot="10800000" flipH="1">
+            <a:off x="4672115" y="2384786"/>
+            <a:ext cx="165741" cy="1787098"/>
+          </a:xfrm>
+          <a:prstGeom prst="bentConnector3">
+            <a:avLst>
+              <a:gd name="adj1" fmla="val -918386"/>
+            </a:avLst>
+          </a:prstGeom>
+          <a:ln w="22225">
+            <a:tailEnd type="triangle"/>
+          </a:ln>
+        </p:spPr>
+        <p:style>
+          <a:lnRef idx="1">
+            <a:schemeClr val="dk1"/>
+          </a:lnRef>
+          <a:fillRef idx="0">
+            <a:schemeClr val="dk1"/>
+          </a:fillRef>
+          <a:effectRef idx="0">
+            <a:schemeClr val="dk1"/>
+          </a:effectRef>
+          <a:fontRef idx="minor">
+            <a:schemeClr val="tx1"/>
+          </a:fontRef>
+        </p:style>
+      </p:cxnSp>
+      <p:sp>
+        <p:nvSpPr>
+          <p:cNvPr id="63" name="矩形 62"/>
           <p:cNvSpPr/>
           <p:nvPr/>
         </p:nvSpPr>
         <p:spPr>
           <a:xfrm>
-            <a:off x="8663190" y="3222909"/>
-            <a:ext cx="747162" cy="375834"/>
-          </a:xfrm>
-          <a:prstGeom prst="rightArrow">
+            <a:off x="5604766" y="4527575"/>
+            <a:ext cx="338554" cy="276999"/>
+          </a:xfrm>
+          <a:prstGeom prst="rect">
             <a:avLst/>
           </a:prstGeom>
         </p:spPr>
-        <p:style>
-          <a:lnRef idx="2">
-            <a:schemeClr val="dk1">
-              <a:shade val="50000"/>
-            </a:schemeClr>
-          </a:lnRef>
-          <a:fillRef idx="1">
-            <a:schemeClr val="dk1"/>
-          </a:fillRef>
-          <a:effectRef idx="0">
-            <a:schemeClr val="dk1"/>
-          </a:effectRef>
-          <a:fontRef idx="minor">
-            <a:schemeClr val="lt1"/>
-          </a:fontRef>
-        </p:style>
-        <p:txBody>
-          <a:bodyPr rtlCol="0" anchor="ctr"/>
+        <p:txBody>
+          <a:bodyPr wrap="none">
+            <a:spAutoFit/>
+          </a:bodyPr>
           <a:lstStyle/>
           <a:p>
             <a:pPr algn="ctr"/>
-            <a:endParaRPr lang="zh-CN" altLang="en-US"/>
+            <a:r>
+              <a:rPr lang="zh-CN" altLang="en-US" sz="1200" smtClean="0">
+                <a:latin typeface="微软雅黑" panose="020B0503020204020204" pitchFamily="34" charset="-122"/>
+                <a:ea typeface="微软雅黑" panose="020B0503020204020204" pitchFamily="34" charset="-122"/>
+              </a:rPr>
+              <a:t>是</a:t>
+            </a:r>
+            <a:endParaRPr lang="zh-CN" altLang="en-US" sz="1200" dirty="0">
+              <a:latin typeface="微软雅黑" panose="020B0503020204020204" pitchFamily="34" charset="-122"/>
+              <a:ea typeface="微软雅黑" panose="020B0503020204020204" pitchFamily="34" charset="-122"/>
+            </a:endParaRPr>
+          </a:p>
+        </p:txBody>
+      </p:sp>
+      <p:sp>
+        <p:nvSpPr>
+          <p:cNvPr id="64" name="矩形 63"/>
+          <p:cNvSpPr/>
+          <p:nvPr/>
+        </p:nvSpPr>
+        <p:spPr>
+          <a:xfrm>
+            <a:off x="3860598" y="3820564"/>
+            <a:ext cx="338555" cy="276999"/>
+          </a:xfrm>
+          <a:prstGeom prst="rect">
+            <a:avLst/>
+          </a:prstGeom>
+        </p:spPr>
+        <p:txBody>
+          <a:bodyPr wrap="none">
+            <a:spAutoFit/>
+          </a:bodyPr>
+          <a:lstStyle/>
+          <a:p>
+            <a:pPr algn="ctr"/>
+            <a:r>
+              <a:rPr lang="zh-CN" altLang="en-US" sz="1200" dirty="0">
+                <a:latin typeface="微软雅黑" panose="020B0503020204020204" pitchFamily="34" charset="-122"/>
+                <a:ea typeface="微软雅黑" panose="020B0503020204020204" pitchFamily="34" charset="-122"/>
+              </a:rPr>
+              <a:t>否</a:t>
+            </a:r>
+          </a:p>
+        </p:txBody>
+      </p:sp>
+      <p:sp>
+        <p:nvSpPr>
+          <p:cNvPr id="65" name="矩形 64"/>
+          <p:cNvSpPr/>
+          <p:nvPr/>
+        </p:nvSpPr>
+        <p:spPr>
+          <a:xfrm>
+            <a:off x="5615637" y="5596666"/>
+            <a:ext cx="800219" cy="276999"/>
+          </a:xfrm>
+          <a:prstGeom prst="rect">
+            <a:avLst/>
+          </a:prstGeom>
+        </p:spPr>
+        <p:txBody>
+          <a:bodyPr wrap="none">
+            <a:spAutoFit/>
+          </a:bodyPr>
+          <a:lstStyle/>
+          <a:p>
+            <a:pPr algn="ctr"/>
+            <a:r>
+              <a:rPr lang="zh-CN" altLang="en-US" sz="1200" dirty="0" smtClean="0">
+                <a:latin typeface="微软雅黑" panose="020B0503020204020204" pitchFamily="34" charset="-122"/>
+                <a:ea typeface="微软雅黑" panose="020B0503020204020204" pitchFamily="34" charset="-122"/>
+              </a:rPr>
+              <a:t>目标匹配</a:t>
+            </a:r>
+            <a:endParaRPr lang="zh-CN" altLang="en-US" sz="1200" dirty="0">
+              <a:latin typeface="微软雅黑" panose="020B0503020204020204" pitchFamily="34" charset="-122"/>
+              <a:ea typeface="微软雅黑" panose="020B0503020204020204" pitchFamily="34" charset="-122"/>
+            </a:endParaRPr>
+          </a:p>
+        </p:txBody>
+      </p:sp>
+      <p:sp>
+        <p:nvSpPr>
+          <p:cNvPr id="66" name="矩形 65"/>
+          <p:cNvSpPr/>
+          <p:nvPr/>
+        </p:nvSpPr>
+        <p:spPr>
+          <a:xfrm>
+            <a:off x="3698774" y="5204699"/>
+            <a:ext cx="954107" cy="276999"/>
+          </a:xfrm>
+          <a:prstGeom prst="rect">
+            <a:avLst/>
+          </a:prstGeom>
+        </p:spPr>
+        <p:txBody>
+          <a:bodyPr wrap="none">
+            <a:spAutoFit/>
+          </a:bodyPr>
+          <a:lstStyle/>
+          <a:p>
+            <a:pPr algn="ctr"/>
+            <a:r>
+              <a:rPr lang="zh-CN" altLang="en-US" sz="1200" dirty="0" smtClean="0">
+                <a:latin typeface="微软雅黑" panose="020B0503020204020204" pitchFamily="34" charset="-122"/>
+                <a:ea typeface="微软雅黑" panose="020B0503020204020204" pitchFamily="34" charset="-122"/>
+              </a:rPr>
+              <a:t>目标不匹配</a:t>
+            </a:r>
+            <a:endParaRPr lang="zh-CN" altLang="en-US" sz="1200" dirty="0">
+              <a:latin typeface="微软雅黑" panose="020B0503020204020204" pitchFamily="34" charset="-122"/>
+              <a:ea typeface="微软雅黑" panose="020B0503020204020204" pitchFamily="34" charset="-122"/>
+            </a:endParaRPr>
+          </a:p>
+        </p:txBody>
+      </p:sp>
+      <p:sp>
+        <p:nvSpPr>
+          <p:cNvPr id="28" name="矩形 27"/>
+          <p:cNvSpPr/>
+          <p:nvPr/>
+        </p:nvSpPr>
+        <p:spPr>
+          <a:xfrm>
+            <a:off x="6906469" y="725527"/>
+            <a:ext cx="954107" cy="276999"/>
+          </a:xfrm>
+          <a:prstGeom prst="rect">
+            <a:avLst/>
+          </a:prstGeom>
+        </p:spPr>
+        <p:txBody>
+          <a:bodyPr wrap="none">
+            <a:spAutoFit/>
+          </a:bodyPr>
+          <a:lstStyle/>
+          <a:p>
+            <a:pPr algn="ctr"/>
+            <a:r>
+              <a:rPr lang="zh-CN" altLang="en-US" sz="1200" dirty="0" smtClean="0">
+                <a:latin typeface="微软雅黑" panose="020B0503020204020204" pitchFamily="34" charset="-122"/>
+                <a:ea typeface="微软雅黑" panose="020B0503020204020204" pitchFamily="34" charset="-122"/>
+              </a:rPr>
+              <a:t>形式化描述</a:t>
+            </a:r>
+            <a:endParaRPr lang="zh-CN" altLang="en-US" sz="1200" dirty="0">
+              <a:latin typeface="微软雅黑" panose="020B0503020204020204" pitchFamily="34" charset="-122"/>
+              <a:ea typeface="微软雅黑" panose="020B0503020204020204" pitchFamily="34" charset="-122"/>
+            </a:endParaRPr>
           </a:p>
         </p:txBody>
       </p:sp>

</xml_diff>